<commit_message>
updated poster with comments
</commit_message>
<xml_diff>
--- a/Mary Kait Heeren Dice Combos Presentation Poster.pptx
+++ b/Mary Kait Heeren Dice Combos Presentation Poster.pptx
@@ -132,12 +132,122 @@
 </p:presentation>
 </file>
 
+<file path=ppt/commentAuthors.xml><?xml version="1.0" encoding="utf-8"?>
+<p:cmAuthorLst xmlns:a="http://schemas.openxmlformats.org/drawingml/2006/main" xmlns:r="http://schemas.openxmlformats.org/officeDocument/2006/relationships" xmlns:p="http://schemas.openxmlformats.org/presentationml/2006/main">
+  <p:cmAuthor id="1" name="Jeremy Becnel" initials="JB" lastIdx="9" clrIdx="0">
+    <p:extLst>
+      <p:ext uri="{19B8F6BF-5375-455C-9EA6-DF929625EA0E}">
+        <p15:presenceInfo xmlns:p15="http://schemas.microsoft.com/office/powerpoint/2012/main" userId="S::becneljj@sfasu.edu::83c67da8-0358-45df-a8cb-c23f6394336a" providerId="AD"/>
+      </p:ext>
+    </p:extLst>
+  </p:cmAuthor>
+</p:cmAuthorLst>
+</file>
+
 <file path=ppt/revisionInfo.xml><?xml version="1.0" encoding="utf-8"?>
 <p1510:revInfo xmlns:a="http://schemas.openxmlformats.org/drawingml/2006/main" xmlns:r="http://schemas.openxmlformats.org/officeDocument/2006/relationships" xmlns:p1510="http://schemas.microsoft.com/office/powerpoint/2015/10/main">
   <p1510:revLst>
     <p1510:client id="{3140F632-45D5-46B1-8A8C-98F51C064F8D}" v="19" dt="2024-08-19T03:21:01.588"/>
   </p1510:revLst>
 </p1510:revInfo>
+</file>
+
+<file path=ppt/comments/comment1.xml><?xml version="1.0" encoding="utf-8"?>
+<p:cmLst xmlns:a="http://schemas.openxmlformats.org/drawingml/2006/main" xmlns:r="http://schemas.openxmlformats.org/officeDocument/2006/relationships" xmlns:p="http://schemas.openxmlformats.org/presentationml/2006/main">
+  <p:cm authorId="1" dt="2024-09-02T18:31:35.596" idx="1">
+    <p:pos x="15552" y="10381"/>
+    <p:text>So if we move this over, we can have an example where there are two die tied for "best" in a certain configuration.</p:text>
+    <p:extLst>
+      <p:ext uri="{C676402C-5697-4E1C-873F-D02D1690AC5C}">
+        <p15:threadingInfo xmlns:p15="http://schemas.microsoft.com/office/powerpoint/2012/main" timeZoneBias="300"/>
+      </p:ext>
+    </p:extLst>
+  </p:cm>
+  <p:cm authorId="1" dt="2024-09-02T18:32:39.475" idx="2">
+    <p:pos x="1058" y="12417"/>
+    <p:text>You might move your example on the right panel to here.</p:text>
+    <p:extLst>
+      <p:ext uri="{C676402C-5697-4E1C-873F-D02D1690AC5C}">
+        <p15:threadingInfo xmlns:p15="http://schemas.microsoft.com/office/powerpoint/2012/main" timeZoneBias="300"/>
+      </p:ext>
+    </p:extLst>
+  </p:cm>
+  <p:cm authorId="1" dt="2024-09-02T18:32:58.522" idx="3">
+    <p:pos x="7501" y="6604"/>
+    <p:text>I have some info on games with asymmetric die. I'd like to inlcude some example like Mario Party. Here are some other:</p:text>
+    <p:extLst>
+      <p:ext uri="{C676402C-5697-4E1C-873F-D02D1690AC5C}">
+        <p15:threadingInfo xmlns:p15="http://schemas.microsoft.com/office/powerpoint/2012/main" timeZoneBias="300"/>
+      </p:ext>
+    </p:extLst>
+  </p:cm>
+  <p:cm authorId="1" dt="2024-09-02T18:33:44.830" idx="4">
+    <p:pos x="7501" y="6700"/>
+    <p:text>Mino Dice  - dice have faces like 
+1, 1 , 1, 2, 7, flag
+Rock, Rock, Rock, 4, 5, flag
+Paper, paper, paper, 3, 4, flag
+Etc...
+Dice forge - actual literal modular Dice you edit as you progress through the game
+Eclipse - weapon types have different hit values, most dice are 3x blank, 3x single hit, and there are some that have 4x blank, 2x 4 hits, some that have 2 blank 4 double hits, etc could be misremembering
+Reavers/ champions of Midgard- all dice types have different faces that mean different things. Reavers has more commonality between die faces, champions has more variety and varying hit values
+Batman: Arkham Chronicles - ok this is a stretch considering it's like a $300 board game but it's got something similar to eclipse, each type of dice has a different hit spread and hit count per hit, with variance in those, too</p:text>
+    <p:extLst>
+      <p:ext uri="{C676402C-5697-4E1C-873F-D02D1690AC5C}">
+        <p15:threadingInfo xmlns:p15="http://schemas.microsoft.com/office/powerpoint/2012/main" timeZoneBias="300">
+          <p15:parentCm authorId="1" idx="3"/>
+        </p15:threadingInfo>
+      </p:ext>
+    </p:extLst>
+  </p:cm>
+  <p:cm authorId="1" dt="2024-09-02T18:34:09.563" idx="5">
+    <p:pos x="17376" y="5651"/>
+    <p:text>Let's change n and k to sides and pips for the examples</p:text>
+    <p:extLst>
+      <p:ext uri="{C676402C-5697-4E1C-873F-D02D1690AC5C}">
+        <p15:threadingInfo xmlns:p15="http://schemas.microsoft.com/office/powerpoint/2012/main" timeZoneBias="300"/>
+      </p:ext>
+    </p:extLst>
+  </p:cm>
+  <p:cm authorId="1" dt="2024-09-02T18:35:56.183" idx="6">
+    <p:pos x="21004" y="3711"/>
+    <p:text>Double check this with code.</p:text>
+    <p:extLst>
+      <p:ext uri="{C676402C-5697-4E1C-873F-D02D1690AC5C}">
+        <p15:threadingInfo xmlns:p15="http://schemas.microsoft.com/office/powerpoint/2012/main" timeZoneBias="300"/>
+      </p:ext>
+    </p:extLst>
+  </p:cm>
+  <p:cm authorId="1" dt="2024-09-02T18:36:26.786" idx="7">
+    <p:pos x="16490" y="19021"/>
+    <p:text>You can change this part. You may want to thank the Honors college.</p:text>
+    <p:extLst>
+      <p:ext uri="{C676402C-5697-4E1C-873F-D02D1690AC5C}">
+        <p15:threadingInfo xmlns:p15="http://schemas.microsoft.com/office/powerpoint/2012/main" timeZoneBias="300"/>
+      </p:ext>
+    </p:extLst>
+  </p:cm>
+  <p:cm authorId="1" dt="2024-09-02T18:37:02.113" idx="8">
+    <p:pos x="16490" y="19117"/>
+    <p:text>and the CS Department</p:text>
+    <p:extLst>
+      <p:ext uri="{C676402C-5697-4E1C-873F-D02D1690AC5C}">
+        <p15:threadingInfo xmlns:p15="http://schemas.microsoft.com/office/powerpoint/2012/main" timeZoneBias="300">
+          <p15:parentCm authorId="1" idx="7"/>
+        </p15:threadingInfo>
+      </p:ext>
+    </p:extLst>
+  </p:cm>
+  <p:cm authorId="1" dt="2024-09-02T18:37:07.359" idx="9">
+    <p:pos x="19209" y="18995"/>
+    <p:text>We can make the repo public so you can think your code.</p:text>
+    <p:extLst>
+      <p:ext uri="{C676402C-5697-4E1C-873F-D02D1690AC5C}">
+        <p15:threadingInfo xmlns:p15="http://schemas.microsoft.com/office/powerpoint/2012/main" timeZoneBias="300"/>
+      </p:ext>
+    </p:extLst>
+  </p:cm>
+</p:cmLst>
 </file>
 
 <file path=ppt/handoutMasters/handoutMaster1.xml><?xml version="1.0" encoding="utf-8"?>
@@ -234,7 +344,7 @@
           <a:p>
             <a:fld id="{7151A46D-D41C-4A90-A00B-41DB1F43CE1D}" type="datetimeFigureOut">
               <a:rPr lang="en-US" smtClean="0"/>
-              <a:t>8/30/2024</a:t>
+              <a:t>9/2/2024</a:t>
             </a:fld>
             <a:endParaRPr lang="en-US"/>
           </a:p>
@@ -411,7 +521,7 @@
           <a:p>
             <a:fld id="{06CA19FA-A97A-4A00-A435-23AB33AC757B}" type="datetimeFigureOut">
               <a:rPr lang="en-US" smtClean="0"/>
-              <a:t>8/30/2024</a:t>
+              <a:t>9/2/2024</a:t>
             </a:fld>
             <a:endParaRPr lang="en-US"/>
           </a:p>
@@ -960,7 +1070,7 @@
           <a:p>
             <a:fld id="{985D6BDF-9D0E-4E2B-85B8-D8F4790360C9}" type="datetimeFigureOut">
               <a:rPr lang="en-US" smtClean="0"/>
-              <a:t>8/30/2024</a:t>
+              <a:t>9/2/2024</a:t>
             </a:fld>
             <a:endParaRPr lang="en-US" dirty="0"/>
           </a:p>
@@ -2334,7 +2444,7 @@
                 </a:solidFill>
                 <a:latin typeface="+mn-lt"/>
               </a:rPr>
-              <a:t>Combinatorial Analysis of Dice Configurations</a:t>
+              <a:t>Analysis of Optimal Die Configurations</a:t>
             </a:r>
           </a:p>
         </p:txBody>
@@ -2916,7 +3026,7 @@
                 <a:latin typeface="+mn-lt"/>
                 <a:cs typeface="Arial" panose="020B0604020202020204" pitchFamily="34" charset="0"/>
               </a:rPr>
-              <a:t>The intent of this exploration is to analyze the mathematical intricacies involved in constructing dice with n faces and k pips, with a focus on combinatorial analysis. The initial motivation stemmed from the development of a Python program designed to generate and compare dice configurations. This program served as a practical tool for visualizing die combinations and led to a deeper investigation into related mathematical concepts.</a:t>
+              <a:t>This exploration aims to analyze the mathematical intricacies involved in constructing dice with n faces and k pips, with a focus on combinatorial analysis. The initial motivation stemmed from developing a Python program to generate and compare dice configurations. This program is a practical tool for visualizing die combinations, leading to a deeper investigation into related mathematical concepts.</a:t>
             </a:r>
           </a:p>
           <a:p>
@@ -2931,7 +3041,7 @@
                 <a:latin typeface="+mn-lt"/>
                 <a:cs typeface="Arial" panose="020B0604020202020204" pitchFamily="34" charset="0"/>
               </a:rPr>
-              <a:t>The investigation delves into the combinatorial aspects of dice configurations, examining how different setups influence the probability of winning. Additionally, it explores the concept of transitivity in dice relationships through examples and mathematical proofs, providing insights into the theoretical foundations of dice performance.</a:t>
+              <a:t>The investigation uses an algorithm to construct all possible dice and compares the die to determine the optimal configuration, which is the configuration with the highest probability of winning.  Additionally, we explore properties of the die including the concept of transitivity in dice relationships.</a:t>
             </a:r>
           </a:p>
         </p:txBody>
@@ -4139,7 +4249,7 @@
         <p:spPr bwMode="auto">
           <a:xfrm>
             <a:off x="29281582" y="22138672"/>
-            <a:ext cx="13167360" cy="6186262"/>
+            <a:ext cx="13167360" cy="5201377"/>
           </a:xfrm>
           <a:prstGeom prst="rect">
             <a:avLst/>
@@ -4262,7 +4372,19 @@
               <a:rPr lang="en-US" sz="3200" dirty="0">
                 <a:latin typeface="Calibri" pitchFamily="34" charset="0"/>
               </a:rPr>
-              <a:t>Through the development of a python method for generating and comparing dice configurations, we observed transitivity does not universally hold amongst dice comparisons. We explored variations of comparison including “overall strength” versus “face-to-face” comparison and how outcomes will vary between both in regards to transitivity.  We utilized the principle of the Bell Triangle to explore and quantify the number of possible dice configurations. </a:t>
+              <a:t>We have developed algorithms to generate and compare dice configurations. We observed that transitivity does not universally hold amongst dice comparisons. We also noted that there are situations</a:t>
+            </a:r>
+            <a:r>
+              <a:rPr lang="en-US" sz="3200" b="1" dirty="0">
+                <a:latin typeface="Calibri" pitchFamily="34" charset="0"/>
+              </a:rPr>
+              <a:t> with no maximal or best die. </a:t>
+            </a:r>
+            <a:r>
+              <a:rPr lang="en-US" sz="3200" dirty="0">
+                <a:latin typeface="Calibri" pitchFamily="34" charset="0"/>
+              </a:rPr>
+              <a:t>We utilized the principle of the Bell Triangle to explore and quantify the number of possible dice configurations. </a:t>
             </a:r>
           </a:p>
           <a:p>
@@ -4277,7 +4399,7 @@
               <a:rPr lang="en-US" sz="3200" dirty="0">
                 <a:latin typeface="Calibri" pitchFamily="34" charset="0"/>
               </a:rPr>
-              <a:t>Overall, this research highlights the complexity of dice analysis that range from applications in programming to combinatorics. These results suggest an unconventional nature of dice and open the door for further investigation into the behavior of dice and their application in different environments. </a:t>
+              <a:t>Overall, this research highlights the complexity of dice analysis, which has applications in programming and combinatorics. These results suggest dice's unconventional nature and open the door for further investigation into their behavior and application in different environments. </a:t>
             </a:r>
           </a:p>
         </p:txBody>
@@ -4348,7 +4470,7 @@
         <p:spPr bwMode="auto">
           <a:xfrm>
             <a:off x="1463040" y="13075920"/>
-            <a:ext cx="13167360" cy="15450081"/>
+            <a:ext cx="13167360" cy="15770040"/>
           </a:xfrm>
           <a:prstGeom prst="rect">
             <a:avLst/>
@@ -4511,7 +4633,7 @@
                 <a:ea typeface="Aptos" panose="020B0004020202020204" pitchFamily="34" charset="0"/>
                 <a:cs typeface="Times New Roman" panose="02020603050405020304" pitchFamily="18" charset="0"/>
               </a:rPr>
-              <a:t>method creates every possible arrangement of pips on a die with a specific number of faces and a total number of pips. It starts by finding all possible ways to divide the total number of pips into groups, where each group represents the pips on a face of the die. The method ensures that each face has at least one pip and checks each configuration to make sure it’s valid and unique. It then organizes these configurations and provides a list of all possible, distinct dice setups.</a:t>
+              <a:t>method creates every possible arrangement of pips on a die with a specific number of faces and a total number of pips..</a:t>
             </a:r>
           </a:p>
           <a:p>
@@ -4555,6 +4677,75 @@
             <a:endParaRPr lang="en-US" sz="3200" dirty="0">
               <a:latin typeface="+mn-lt"/>
             </a:endParaRPr>
+          </a:p>
+          <a:p>
+            <a:pPr eaLnBrk="1" hangingPunct="1"/>
+            <a:endParaRPr lang="en-US" sz="3200" dirty="0">
+              <a:latin typeface="+mn-lt"/>
+            </a:endParaRPr>
+          </a:p>
+          <a:p>
+            <a:pPr eaLnBrk="1" hangingPunct="1"/>
+            <a:r>
+              <a:rPr lang="en-US" sz="3200" b="1" dirty="0">
+                <a:latin typeface="+mn-lt"/>
+              </a:rPr>
+              <a:t>Definition. </a:t>
+            </a:r>
+            <a:r>
+              <a:rPr lang="en-US" sz="3200" dirty="0">
+                <a:latin typeface="+mn-lt"/>
+              </a:rPr>
+              <a:t>Given two dice ad with the same number of sides, we say a die A is said to </a:t>
+            </a:r>
+            <a:r>
+              <a:rPr lang="en-US" sz="3200" b="1" dirty="0">
+                <a:latin typeface="+mn-lt"/>
+              </a:rPr>
+              <a:t>beat </a:t>
+            </a:r>
+            <a:r>
+              <a:rPr lang="en-US" sz="3200" dirty="0">
+                <a:latin typeface="+mn-lt"/>
+              </a:rPr>
+              <a:t>or another die B if given every pairing of sides (</a:t>
+            </a:r>
+            <a:r>
+              <a:rPr lang="en-US" sz="3200" dirty="0" err="1">
+                <a:latin typeface="+mn-lt"/>
+              </a:rPr>
+              <a:t>a,b</a:t>
+            </a:r>
+            <a:r>
+              <a:rPr lang="en-US" sz="3200" dirty="0">
+                <a:latin typeface="+mn-lt"/>
+              </a:rPr>
+              <a:t>) where a is said from A and B is a side of A, the majority of the pairing have a &gt; b.</a:t>
+            </a:r>
+            <a:endParaRPr lang="en-US" sz="3200" b="1" dirty="0">
+              <a:latin typeface="+mn-lt"/>
+            </a:endParaRPr>
+          </a:p>
+          <a:p>
+            <a:pPr eaLnBrk="1" hangingPunct="1"/>
+            <a:endParaRPr lang="en-US" sz="3200" dirty="0">
+              <a:latin typeface="+mn-lt"/>
+            </a:endParaRPr>
+          </a:p>
+          <a:p>
+            <a:pPr eaLnBrk="1" hangingPunct="1"/>
+            <a:r>
+              <a:rPr lang="en-US" sz="3200" b="1" dirty="0">
+                <a:latin typeface="+mn-lt"/>
+              </a:rPr>
+              <a:t>Example</a:t>
+            </a:r>
+            <a:r>
+              <a:rPr lang="en-US" sz="3200" dirty="0">
+                <a:latin typeface="+mn-lt"/>
+              </a:rPr>
+              <a:t>: Give your example to the right here:</a:t>
+            </a:r>
           </a:p>
           <a:p>
             <a:pPr eaLnBrk="1" hangingPunct="1"/>
@@ -4813,140 +5004,6 @@
           </a:prstGeom>
         </p:spPr>
       </p:pic>
-      <p:grpSp>
-        <p:nvGrpSpPr>
-          <p:cNvPr id="37" name="Group 36">
-            <a:extLst>
-              <a:ext uri="{FF2B5EF4-FFF2-40B4-BE49-F238E27FC236}">
-                <a16:creationId xmlns:a16="http://schemas.microsoft.com/office/drawing/2014/main" id="{5914D990-2504-4B21-A6EB-04FF4361B89B}"/>
-              </a:ext>
-            </a:extLst>
-          </p:cNvPr>
-          <p:cNvGrpSpPr/>
-          <p:nvPr/>
-        </p:nvGrpSpPr>
-        <p:grpSpPr>
-          <a:xfrm>
-            <a:off x="34461329" y="875014"/>
-            <a:ext cx="8421724" cy="2242944"/>
-            <a:chOff x="502920" y="30815280"/>
-            <a:chExt cx="26517600" cy="7062391"/>
-          </a:xfrm>
-        </p:grpSpPr>
-        <p:sp>
-          <p:nvSpPr>
-            <p:cNvPr id="38" name="Rectangle 37">
-              <a:extLst>
-                <a:ext uri="{FF2B5EF4-FFF2-40B4-BE49-F238E27FC236}">
-                  <a16:creationId xmlns:a16="http://schemas.microsoft.com/office/drawing/2014/main" id="{F98B8427-E96B-461B-9744-6E372A321F21}"/>
-                </a:ext>
-              </a:extLst>
-            </p:cNvPr>
-            <p:cNvSpPr/>
-            <p:nvPr/>
-          </p:nvSpPr>
-          <p:spPr>
-            <a:xfrm>
-              <a:off x="502920" y="30815280"/>
-              <a:ext cx="26517600" cy="7062391"/>
-            </a:xfrm>
-            <a:prstGeom prst="rect">
-              <a:avLst/>
-            </a:prstGeom>
-            <a:solidFill>
-              <a:schemeClr val="bg1"/>
-            </a:solidFill>
-          </p:spPr>
-          <p:style>
-            <a:lnRef idx="2">
-              <a:schemeClr val="accent1">
-                <a:shade val="50000"/>
-              </a:schemeClr>
-            </a:lnRef>
-            <a:fillRef idx="1">
-              <a:schemeClr val="accent1"/>
-            </a:fillRef>
-            <a:effectRef idx="0">
-              <a:schemeClr val="accent1"/>
-            </a:effectRef>
-            <a:fontRef idx="minor">
-              <a:schemeClr val="lt1"/>
-            </a:fontRef>
-          </p:style>
-          <p:txBody>
-            <a:bodyPr rtlCol="0" anchor="ctr"/>
-            <a:lstStyle/>
-            <a:p>
-              <a:pPr marL="0" marR="0" lvl="0" indent="0" algn="ctr" defTabSz="457200" rtl="0" eaLnBrk="1" fontAlgn="auto" latinLnBrk="0" hangingPunct="1">
-                <a:lnSpc>
-                  <a:spcPct val="100000"/>
-                </a:lnSpc>
-                <a:spcBef>
-                  <a:spcPts val="0"/>
-                </a:spcBef>
-                <a:spcAft>
-                  <a:spcPts val="0"/>
-                </a:spcAft>
-                <a:buClrTx/>
-                <a:buSzTx/>
-                <a:buFontTx/>
-                <a:buNone/>
-                <a:tabLst/>
-                <a:defRPr/>
-              </a:pPr>
-              <a:endParaRPr kumimoji="0" lang="en-US" sz="1800" b="0" i="0" u="none" strike="noStrike" kern="1200" cap="none" spc="0" normalizeH="0" baseline="0" noProof="0">
-                <a:ln>
-                  <a:noFill/>
-                </a:ln>
-                <a:solidFill>
-                  <a:prstClr val="white"/>
-                </a:solidFill>
-                <a:effectLst/>
-                <a:uLnTx/>
-                <a:uFillTx/>
-                <a:latin typeface="Calibri" panose="020F0502020204030204"/>
-                <a:ea typeface="+mn-ea"/>
-                <a:cs typeface="+mn-cs"/>
-              </a:endParaRPr>
-            </a:p>
-          </p:txBody>
-        </p:sp>
-        <p:pic>
-          <p:nvPicPr>
-            <p:cNvPr id="39" name="Picture 38">
-              <a:extLst>
-                <a:ext uri="{FF2B5EF4-FFF2-40B4-BE49-F238E27FC236}">
-                  <a16:creationId xmlns:a16="http://schemas.microsoft.com/office/drawing/2014/main" id="{A0F6B9BD-1217-4B82-B0E3-0A91720D1424}"/>
-                </a:ext>
-              </a:extLst>
-            </p:cNvPr>
-            <p:cNvPicPr>
-              <a:picLocks noChangeAspect="1"/>
-            </p:cNvPicPr>
-            <p:nvPr/>
-          </p:nvPicPr>
-          <p:blipFill rotWithShape="1">
-            <a:blip r:embed="rId7" cstate="print">
-              <a:extLst>
-                <a:ext uri="{28A0092B-C50C-407E-A947-70E740481C1C}">
-                  <a14:useLocalDpi xmlns:a14="http://schemas.microsoft.com/office/drawing/2010/main" val="0"/>
-                </a:ext>
-              </a:extLst>
-            </a:blip>
-            <a:srcRect t="14538" b="12773"/>
-            <a:stretch/>
-          </p:blipFill>
-          <p:spPr>
-            <a:xfrm>
-              <a:off x="862690" y="31135320"/>
-              <a:ext cx="25745902" cy="6540717"/>
-            </a:xfrm>
-            <a:prstGeom prst="rect">
-              <a:avLst/>
-            </a:prstGeom>
-          </p:spPr>
-        </p:pic>
-      </p:grpSp>
       <p:pic>
         <p:nvPicPr>
           <p:cNvPr id="6" name="Picture 5">
@@ -4962,7 +5019,7 @@
           <p:nvPr/>
         </p:nvPicPr>
         <p:blipFill>
-          <a:blip r:embed="rId8"/>
+          <a:blip r:embed="rId7"/>
           <a:stretch>
             <a:fillRect/>
           </a:stretch>
@@ -4997,13 +5054,13 @@
           <p:nvPr/>
         </p:nvPicPr>
         <p:blipFill rotWithShape="1">
-          <a:blip r:embed="rId9"/>
+          <a:blip r:embed="rId8"/>
           <a:srcRect r="62458"/>
           <a:stretch/>
         </p:blipFill>
         <p:spPr>
           <a:xfrm>
-            <a:off x="5867400" y="16929462"/>
+            <a:off x="5995415" y="14303183"/>
             <a:ext cx="3918861" cy="3777171"/>
           </a:xfrm>
           <a:prstGeom prst="rect">
@@ -5031,7 +5088,7 @@
           <p:nvPr/>
         </p:nvPicPr>
         <p:blipFill rotWithShape="1">
-          <a:blip r:embed="rId10"/>
+          <a:blip r:embed="rId9"/>
           <a:srcRect r="572" b="54117"/>
           <a:stretch/>
         </p:blipFill>
@@ -5065,7 +5122,7 @@
           <p:nvPr/>
         </p:nvPicPr>
         <p:blipFill rotWithShape="1">
-          <a:blip r:embed="rId10"/>
+          <a:blip r:embed="rId9"/>
           <a:srcRect t="50000" r="413" b="2046"/>
           <a:stretch/>
         </p:blipFill>
@@ -5252,7 +5309,7 @@
           <p:nvPr/>
         </p:nvPicPr>
         <p:blipFill>
-          <a:blip r:embed="rId11"/>
+          <a:blip r:embed="rId10"/>
           <a:stretch>
             <a:fillRect/>
           </a:stretch>
@@ -5287,7 +5344,7 @@
           <p:nvPr/>
         </p:nvPicPr>
         <p:blipFill>
-          <a:blip r:embed="rId12"/>
+          <a:blip r:embed="rId11"/>
           <a:stretch>
             <a:fillRect/>
           </a:stretch>
@@ -5322,7 +5379,7 @@
           <p:nvPr/>
         </p:nvPicPr>
         <p:blipFill>
-          <a:blip r:embed="rId13"/>
+          <a:blip r:embed="rId12"/>
           <a:stretch>
             <a:fillRect/>
           </a:stretch>

</xml_diff>